<commit_message>
Updated layout.png and README.md to match new wording, some rewriting in README.md
</commit_message>
<xml_diff>
--- a/extensions/binary_glTF/Figures.pptx
+++ b/extensions/binary_glTF/Figures.pptx
@@ -64,7 +64,7 @@
         <p:spPr>
           <a:xfrm>
             <a:off x="685800" y="2130480"/>
-            <a:ext cx="7771680" cy="1469880"/>
+            <a:ext cx="7771320" cy="1469880"/>
           </a:xfrm>
           <a:prstGeom prst="rect">
             <a:avLst/>
@@ -91,7 +91,7 @@
         <p:spPr>
           <a:xfrm>
             <a:off x="457200" y="1604520"/>
-            <a:ext cx="8229240" cy="1896840"/>
+            <a:ext cx="8228880" cy="1896840"/>
           </a:xfrm>
           <a:prstGeom prst="rect">
             <a:avLst/>
@@ -117,7 +117,7 @@
         <p:spPr>
           <a:xfrm>
             <a:off x="457200" y="3682080"/>
-            <a:ext cx="8229240" cy="1896840"/>
+            <a:ext cx="8228880" cy="1896840"/>
           </a:xfrm>
           <a:prstGeom prst="rect">
             <a:avLst/>
@@ -165,7 +165,7 @@
         <p:spPr>
           <a:xfrm>
             <a:off x="685800" y="2130480"/>
-            <a:ext cx="7771680" cy="1469880"/>
+            <a:ext cx="7771320" cy="1469880"/>
           </a:xfrm>
           <a:prstGeom prst="rect">
             <a:avLst/>
@@ -192,7 +192,7 @@
         <p:spPr>
           <a:xfrm>
             <a:off x="457200" y="1604520"/>
-            <a:ext cx="4015800" cy="1896840"/>
+            <a:ext cx="4015440" cy="1896840"/>
           </a:xfrm>
           <a:prstGeom prst="rect">
             <a:avLst/>
@@ -217,8 +217,8 @@
         </p:nvSpPr>
         <p:spPr>
           <a:xfrm>
-            <a:off x="4674240" y="1604520"/>
-            <a:ext cx="4015800" cy="1896840"/>
+            <a:off x="4673880" y="1604520"/>
+            <a:ext cx="4015440" cy="1896840"/>
           </a:xfrm>
           <a:prstGeom prst="rect">
             <a:avLst/>
@@ -243,8 +243,8 @@
         </p:nvSpPr>
         <p:spPr>
           <a:xfrm>
-            <a:off x="4674240" y="3682080"/>
-            <a:ext cx="4015800" cy="1896840"/>
+            <a:off x="4673880" y="3682080"/>
+            <a:ext cx="4015440" cy="1896840"/>
           </a:xfrm>
           <a:prstGeom prst="rect">
             <a:avLst/>
@@ -270,7 +270,7 @@
         <p:spPr>
           <a:xfrm>
             <a:off x="457200" y="3682080"/>
-            <a:ext cx="4015800" cy="1896840"/>
+            <a:ext cx="4015440" cy="1896840"/>
           </a:xfrm>
           <a:prstGeom prst="rect">
             <a:avLst/>
@@ -318,7 +318,7 @@
         <p:spPr>
           <a:xfrm>
             <a:off x="685800" y="2130480"/>
-            <a:ext cx="7771680" cy="1469880"/>
+            <a:ext cx="7771320" cy="1469880"/>
           </a:xfrm>
           <a:prstGeom prst="rect">
             <a:avLst/>
@@ -345,7 +345,7 @@
         <p:spPr>
           <a:xfrm>
             <a:off x="457200" y="1604520"/>
-            <a:ext cx="8229240" cy="3977280"/>
+            <a:ext cx="8228880" cy="3976920"/>
           </a:xfrm>
           <a:prstGeom prst="rect">
             <a:avLst/>
@@ -371,7 +371,7 @@
         <p:spPr>
           <a:xfrm>
             <a:off x="457200" y="1604520"/>
-            <a:ext cx="8229240" cy="3977280"/>
+            <a:ext cx="8228880" cy="3976920"/>
           </a:xfrm>
           <a:prstGeom prst="rect">
             <a:avLst/>
@@ -398,8 +398,8 @@
         </p:blipFill>
         <p:spPr>
           <a:xfrm>
-            <a:off x="2079000" y="1604520"/>
-            <a:ext cx="4984920" cy="3977280"/>
+            <a:off x="2079360" y="1604160"/>
+            <a:ext cx="4984200" cy="3976920"/>
           </a:xfrm>
           <a:prstGeom prst="rect">
             <a:avLst/>
@@ -423,8 +423,8 @@
         </p:blipFill>
         <p:spPr>
           <a:xfrm>
-            <a:off x="2079000" y="1604520"/>
-            <a:ext cx="4984920" cy="3977280"/>
+            <a:off x="2079360" y="1604160"/>
+            <a:ext cx="4984200" cy="3976920"/>
           </a:xfrm>
           <a:prstGeom prst="rect">
             <a:avLst/>
@@ -469,7 +469,7 @@
         <p:spPr>
           <a:xfrm>
             <a:off x="685800" y="2130480"/>
-            <a:ext cx="7771680" cy="1469880"/>
+            <a:ext cx="7771320" cy="1469880"/>
           </a:xfrm>
           <a:prstGeom prst="rect">
             <a:avLst/>
@@ -496,7 +496,7 @@
         <p:spPr>
           <a:xfrm>
             <a:off x="457200" y="1604520"/>
-            <a:ext cx="8229240" cy="3977640"/>
+            <a:ext cx="8228880" cy="3977280"/>
           </a:xfrm>
           <a:prstGeom prst="rect">
             <a:avLst/>
@@ -545,7 +545,7 @@
         <p:spPr>
           <a:xfrm>
             <a:off x="685800" y="2130480"/>
-            <a:ext cx="7771680" cy="1469880"/>
+            <a:ext cx="7771320" cy="1469880"/>
           </a:xfrm>
           <a:prstGeom prst="rect">
             <a:avLst/>
@@ -572,7 +572,7 @@
         <p:spPr>
           <a:xfrm>
             <a:off x="457200" y="1604520"/>
-            <a:ext cx="8229240" cy="3977280"/>
+            <a:ext cx="8228880" cy="3976920"/>
           </a:xfrm>
           <a:prstGeom prst="rect">
             <a:avLst/>
@@ -620,7 +620,7 @@
         <p:spPr>
           <a:xfrm>
             <a:off x="685800" y="2130480"/>
-            <a:ext cx="7771680" cy="1469880"/>
+            <a:ext cx="7771320" cy="1469880"/>
           </a:xfrm>
           <a:prstGeom prst="rect">
             <a:avLst/>
@@ -647,7 +647,7 @@
         <p:spPr>
           <a:xfrm>
             <a:off x="457200" y="1604520"/>
-            <a:ext cx="4015800" cy="3977280"/>
+            <a:ext cx="4015440" cy="3976920"/>
           </a:xfrm>
           <a:prstGeom prst="rect">
             <a:avLst/>
@@ -672,8 +672,8 @@
         </p:nvSpPr>
         <p:spPr>
           <a:xfrm>
-            <a:off x="4674240" y="1604520"/>
-            <a:ext cx="4015800" cy="3977280"/>
+            <a:off x="4673880" y="1604520"/>
+            <a:ext cx="4015440" cy="3976920"/>
           </a:xfrm>
           <a:prstGeom prst="rect">
             <a:avLst/>
@@ -721,7 +721,7 @@
         <p:spPr>
           <a:xfrm>
             <a:off x="685800" y="2130480"/>
-            <a:ext cx="7771680" cy="1469880"/>
+            <a:ext cx="7771320" cy="1469880"/>
           </a:xfrm>
           <a:prstGeom prst="rect">
             <a:avLst/>
@@ -770,7 +770,7 @@
         <p:spPr>
           <a:xfrm>
             <a:off x="685800" y="2130480"/>
-            <a:ext cx="7771680" cy="6813360"/>
+            <a:ext cx="7771320" cy="6813360"/>
           </a:xfrm>
           <a:prstGeom prst="rect">
             <a:avLst/>
@@ -819,7 +819,7 @@
         <p:spPr>
           <a:xfrm>
             <a:off x="685800" y="2130480"/>
-            <a:ext cx="7771680" cy="1469880"/>
+            <a:ext cx="7771320" cy="1469880"/>
           </a:xfrm>
           <a:prstGeom prst="rect">
             <a:avLst/>
@@ -846,7 +846,7 @@
         <p:spPr>
           <a:xfrm>
             <a:off x="457200" y="1604520"/>
-            <a:ext cx="4015800" cy="1896840"/>
+            <a:ext cx="4015440" cy="1896840"/>
           </a:xfrm>
           <a:prstGeom prst="rect">
             <a:avLst/>
@@ -872,7 +872,7 @@
         <p:spPr>
           <a:xfrm>
             <a:off x="457200" y="3682080"/>
-            <a:ext cx="4015800" cy="1896840"/>
+            <a:ext cx="4015440" cy="1896840"/>
           </a:xfrm>
           <a:prstGeom prst="rect">
             <a:avLst/>
@@ -897,8 +897,8 @@
         </p:nvSpPr>
         <p:spPr>
           <a:xfrm>
-            <a:off x="4674240" y="1604520"/>
-            <a:ext cx="4015800" cy="3977280"/>
+            <a:off x="4673880" y="1604520"/>
+            <a:ext cx="4015440" cy="3976920"/>
           </a:xfrm>
           <a:prstGeom prst="rect">
             <a:avLst/>
@@ -946,7 +946,7 @@
         <p:spPr>
           <a:xfrm>
             <a:off x="685800" y="2130480"/>
-            <a:ext cx="7771680" cy="1469880"/>
+            <a:ext cx="7771320" cy="1469880"/>
           </a:xfrm>
           <a:prstGeom prst="rect">
             <a:avLst/>
@@ -973,7 +973,7 @@
         <p:spPr>
           <a:xfrm>
             <a:off x="457200" y="1604520"/>
-            <a:ext cx="4015800" cy="3977280"/>
+            <a:ext cx="4015440" cy="3976920"/>
           </a:xfrm>
           <a:prstGeom prst="rect">
             <a:avLst/>
@@ -998,8 +998,8 @@
         </p:nvSpPr>
         <p:spPr>
           <a:xfrm>
-            <a:off x="4674240" y="1604520"/>
-            <a:ext cx="4015800" cy="1896840"/>
+            <a:off x="4673880" y="1604520"/>
+            <a:ext cx="4015440" cy="1896840"/>
           </a:xfrm>
           <a:prstGeom prst="rect">
             <a:avLst/>
@@ -1024,8 +1024,8 @@
         </p:nvSpPr>
         <p:spPr>
           <a:xfrm>
-            <a:off x="4674240" y="3682080"/>
-            <a:ext cx="4015800" cy="1896840"/>
+            <a:off x="4673880" y="3682080"/>
+            <a:ext cx="4015440" cy="1896840"/>
           </a:xfrm>
           <a:prstGeom prst="rect">
             <a:avLst/>
@@ -1073,7 +1073,7 @@
         <p:spPr>
           <a:xfrm>
             <a:off x="685800" y="2130480"/>
-            <a:ext cx="7771680" cy="1469880"/>
+            <a:ext cx="7771320" cy="1469880"/>
           </a:xfrm>
           <a:prstGeom prst="rect">
             <a:avLst/>
@@ -1100,7 +1100,7 @@
         <p:spPr>
           <a:xfrm>
             <a:off x="457200" y="1604520"/>
-            <a:ext cx="4015800" cy="1896840"/>
+            <a:ext cx="4015440" cy="1896840"/>
           </a:xfrm>
           <a:prstGeom prst="rect">
             <a:avLst/>
@@ -1125,8 +1125,8 @@
         </p:nvSpPr>
         <p:spPr>
           <a:xfrm>
-            <a:off x="4674240" y="1604520"/>
-            <a:ext cx="4015800" cy="1896840"/>
+            <a:off x="4673880" y="1604520"/>
+            <a:ext cx="4015440" cy="1896840"/>
           </a:xfrm>
           <a:prstGeom prst="rect">
             <a:avLst/>
@@ -1152,7 +1152,7 @@
         <p:spPr>
           <a:xfrm>
             <a:off x="457200" y="3682080"/>
-            <a:ext cx="8229240" cy="1896840"/>
+            <a:ext cx="8228880" cy="1896840"/>
           </a:xfrm>
           <a:prstGeom prst="rect">
             <a:avLst/>
@@ -1207,7 +1207,7 @@
         <p:spPr>
           <a:xfrm>
             <a:off x="685800" y="2130480"/>
-            <a:ext cx="7771680" cy="1469520"/>
+            <a:ext cx="7771320" cy="1469520"/>
           </a:xfrm>
           <a:prstGeom prst="rect">
             <a:avLst/>
@@ -1239,7 +1239,7 @@
         <p:spPr>
           <a:xfrm>
             <a:off x="457200" y="1604520"/>
-            <a:ext cx="8229240" cy="3977280"/>
+            <a:ext cx="8228880" cy="3976920"/>
           </a:xfrm>
           <a:prstGeom prst="rect">
             <a:avLst/>
@@ -1254,7 +1254,7 @@
               <a:buChar char=""/>
             </a:pPr>
             <a:r>
-              <a:rPr lang="en-US" sz="3200">
+              <a:rPr lang="en-US">
                 <a:latin typeface="Arial"/>
               </a:rPr>
               <a:t>Click to edit the outline text format</a:t>
@@ -1268,7 +1268,7 @@
               <a:buChar char=""/>
             </a:pPr>
             <a:r>
-              <a:rPr lang="en-US" sz="2800">
+              <a:rPr lang="en-US">
                 <a:latin typeface="Arial"/>
               </a:rPr>
               <a:t>Second Outline Level</a:t>
@@ -1282,7 +1282,7 @@
               <a:buChar char=""/>
             </a:pPr>
             <a:r>
-              <a:rPr lang="en-US" sz="2400">
+              <a:rPr lang="en-US">
                 <a:latin typeface="Arial"/>
               </a:rPr>
               <a:t>Third Outline Level</a:t>
@@ -1296,7 +1296,7 @@
               <a:buChar char=""/>
             </a:pPr>
             <a:r>
-              <a:rPr lang="en-US" sz="2000">
+              <a:rPr lang="en-US">
                 <a:latin typeface="Arial"/>
               </a:rPr>
               <a:t>Fourth Outline Level</a:t>
@@ -1310,7 +1310,7 @@
               <a:buChar char=""/>
             </a:pPr>
             <a:r>
-              <a:rPr lang="en-US" sz="2000">
+              <a:rPr lang="en-US">
                 <a:latin typeface="Arial"/>
               </a:rPr>
               <a:t>Fifth Outline Level</a:t>
@@ -1324,7 +1324,7 @@
               <a:buChar char=""/>
             </a:pPr>
             <a:r>
-              <a:rPr lang="en-US" sz="2000">
+              <a:rPr lang="en-US">
                 <a:latin typeface="Arial"/>
               </a:rPr>
               <a:t>Sixth Outline Level</a:t>
@@ -1338,7 +1338,7 @@
               <a:buChar char=""/>
             </a:pPr>
             <a:r>
-              <a:rPr lang="en-US" sz="2000">
+              <a:rPr lang="en-US">
                 <a:latin typeface="Arial"/>
               </a:rPr>
               <a:t>Seventh Outline Level</a:t>
@@ -1393,7 +1393,7 @@
         <p:spPr>
           <a:xfrm>
             <a:off x="500760" y="662760"/>
-            <a:ext cx="1826640" cy="455040"/>
+            <a:ext cx="1826280" cy="454680"/>
           </a:xfrm>
           <a:prstGeom prst="rect">
             <a:avLst/>
@@ -1471,7 +1471,7 @@
         <p:spPr>
           <a:xfrm>
             <a:off x="2327760" y="662760"/>
-            <a:ext cx="912240" cy="455040"/>
+            <a:ext cx="911880" cy="454680"/>
           </a:xfrm>
           <a:prstGeom prst="rect">
             <a:avLst/>
@@ -1549,7 +1549,7 @@
         <p:spPr>
           <a:xfrm>
             <a:off x="5429880" y="662400"/>
-            <a:ext cx="1278000" cy="455400"/>
+            <a:ext cx="1277640" cy="455040"/>
           </a:xfrm>
           <a:prstGeom prst="rect">
             <a:avLst/>
@@ -1577,7 +1577,7 @@
                 </a:solidFill>
                 <a:latin typeface="Courier New"/>
               </a:rPr>
-              <a:t>headerFormat</a:t>
+              <a:t>sceneFormat</a:t>
             </a:r>
             <a:endParaRPr/>
           </a:p>
@@ -1627,7 +1627,7 @@
         <p:spPr>
           <a:xfrm>
             <a:off x="4152960" y="662760"/>
-            <a:ext cx="1276560" cy="455040"/>
+            <a:ext cx="1276200" cy="454680"/>
           </a:xfrm>
           <a:prstGeom prst="rect">
             <a:avLst/>
@@ -1655,7 +1655,7 @@
                 </a:solidFill>
                 <a:latin typeface="Courier New"/>
               </a:rPr>
-              <a:t>headerLength</a:t>
+              <a:t>sceneLength</a:t>
             </a:r>
             <a:endParaRPr/>
           </a:p>
@@ -1705,7 +1705,7 @@
         <p:spPr>
           <a:xfrm>
             <a:off x="6712200" y="662040"/>
-            <a:ext cx="1093680" cy="455040"/>
+            <a:ext cx="1093320" cy="454680"/>
           </a:xfrm>
           <a:prstGeom prst="rect">
             <a:avLst/>
@@ -1756,7 +1756,7 @@
         <p:spPr>
           <a:xfrm>
             <a:off x="7806240" y="662040"/>
-            <a:ext cx="1166040" cy="455040"/>
+            <a:ext cx="1165680" cy="454680"/>
           </a:xfrm>
           <a:prstGeom prst="rect">
             <a:avLst/>
@@ -1767,7 +1767,7 @@
               <a:srgbClr val="000000"/>
             </a:solidFill>
             <a:custDash>
-              <a:ds d="9800000000" sp="3675000000"/>
+              <a:ds d="35000" sp="35000"/>
             </a:custDash>
             <a:round/>
           </a:ln>
@@ -1819,7 +1819,7 @@
         <p:spPr>
           <a:xfrm>
             <a:off x="6553800" y="1887480"/>
-            <a:ext cx="1341720" cy="616320"/>
+            <a:ext cx="1341360" cy="615960"/>
           </a:xfrm>
           <a:prstGeom prst="ellipse">
             <a:avLst/>
@@ -1832,7 +1832,7 @@
               <a:srgbClr val="000000"/>
             </a:solidFill>
             <a:custDash>
-              <a:ds d="9800000000" sp="3675000000"/>
+              <a:ds d="35000" sp="35000"/>
             </a:custDash>
             <a:round/>
           </a:ln>
@@ -1866,8 +1866,8 @@
         </p:nvSpPr>
         <p:spPr>
           <a:xfrm flipV="1">
-            <a:off x="491040" y="397080"/>
-            <a:ext cx="6220440" cy="1080"/>
+            <a:off x="491040" y="396720"/>
+            <a:ext cx="6220080" cy="720"/>
           </a:xfrm>
           <a:prstGeom prst="straightConnector1">
             <a:avLst/>
@@ -1892,7 +1892,7 @@
         <p:spPr>
           <a:xfrm>
             <a:off x="3139920" y="125640"/>
-            <a:ext cx="1643760" cy="272520"/>
+            <a:ext cx="1643400" cy="272160"/>
           </a:xfrm>
           <a:prstGeom prst="rect">
             <a:avLst/>
@@ -1917,7 +1917,7 @@
                 </a:solidFill>
                 <a:latin typeface="Courier New"/>
               </a:rPr>
-              <a:t>20-byte preamble</a:t>
+              <a:t>20-byte header</a:t>
             </a:r>
             <a:endParaRPr/>
           </a:p>
@@ -1930,14 +1930,12 @@
           <p:nvPr/>
         </p:nvSpPr>
         <p:spPr>
-          <a:xfrm flipH="1" rot="5570400">
-            <a:off x="7659720" y="690840"/>
-            <a:ext cx="11880" cy="876600"/>
-          </a:xfrm>
-          <a:prstGeom prst="curvedConnector3">
-            <a:avLst>
-              <a:gd name="adj1" fmla="val 1800000"/>
-            </a:avLst>
+          <a:xfrm>
+            <a:off x="7221240" y="1136520"/>
+            <a:ext cx="2880" cy="749880"/>
+          </a:xfrm>
+          <a:prstGeom prst="straightConnector1">
+            <a:avLst/>
           </a:prstGeom>
           <a:noFill/>
           <a:ln w="12600">
@@ -1957,32 +1955,8 @@
         </p:nvSpPr>
         <p:spPr>
           <a:xfrm>
-            <a:off x="7221240" y="1136520"/>
-            <a:ext cx="3240" cy="750240"/>
-          </a:xfrm>
-          <a:prstGeom prst="straightConnector1">
-            <a:avLst/>
-          </a:prstGeom>
-          <a:noFill/>
-          <a:ln w="12600">
-            <a:solidFill>
-              <a:srgbClr val="000000"/>
-            </a:solidFill>
-            <a:round/>
-            <a:tailEnd len="med" type="arrow" w="med"/>
-          </a:ln>
-        </p:spPr>
-      </p:sp>
-      <p:sp>
-        <p:nvSpPr>
-          <p:cNvPr id="47" name="CustomShape 12"/>
-          <p:cNvSpPr/>
-          <p:nvPr/>
-        </p:nvSpPr>
-        <p:spPr>
-          <a:xfrm>
-            <a:off x="7193520" y="1381320"/>
-            <a:ext cx="1018800" cy="242280"/>
+            <a:off x="7311600" y="1385280"/>
+            <a:ext cx="1018440" cy="241920"/>
           </a:xfrm>
           <a:prstGeom prst="rect">
             <a:avLst/>
@@ -2015,14 +1989,14 @@
       </p:sp>
       <p:sp>
         <p:nvSpPr>
-          <p:cNvPr id="48" name="CustomShape 13"/>
+          <p:cNvPr id="47" name="CustomShape 12"/>
           <p:cNvSpPr/>
           <p:nvPr/>
         </p:nvSpPr>
         <p:spPr>
           <a:xfrm>
             <a:off x="3240360" y="662760"/>
-            <a:ext cx="912240" cy="455040"/>
+            <a:ext cx="911880" cy="454680"/>
           </a:xfrm>
           <a:prstGeom prst="rect">
             <a:avLst/>
@@ -2093,14 +2067,14 @@
       </p:sp>
       <p:sp>
         <p:nvSpPr>
-          <p:cNvPr id="49" name="CustomShape 14"/>
+          <p:cNvPr id="48" name="CustomShape 13"/>
           <p:cNvSpPr/>
           <p:nvPr/>
         </p:nvSpPr>
         <p:spPr>
           <a:xfrm flipV="1">
-            <a:off x="6731280" y="396360"/>
-            <a:ext cx="1070280" cy="360"/>
+            <a:off x="6731280" y="395280"/>
+            <a:ext cx="1069920" cy="360"/>
           </a:xfrm>
           <a:prstGeom prst="straightConnector1">
             <a:avLst/>
@@ -2118,14 +2092,14 @@
       </p:sp>
       <p:sp>
         <p:nvSpPr>
-          <p:cNvPr id="50" name="CustomShape 15"/>
+          <p:cNvPr id="49" name="CustomShape 14"/>
           <p:cNvSpPr/>
           <p:nvPr/>
         </p:nvSpPr>
         <p:spPr>
           <a:xfrm>
             <a:off x="6940080" y="125280"/>
-            <a:ext cx="727920" cy="272520"/>
+            <a:ext cx="727560" cy="272160"/>
           </a:xfrm>
           <a:prstGeom prst="rect">
             <a:avLst/>
@@ -2150,22 +2124,22 @@
                 </a:solidFill>
                 <a:latin typeface="Courier New"/>
               </a:rPr>
-              <a:t>header</a:t>
-            </a:r>
-            <a:endParaRPr/>
-          </a:p>
-        </p:txBody>
-      </p:sp>
-      <p:sp>
-        <p:nvSpPr>
-          <p:cNvPr id="51" name="CustomShape 16"/>
+              <a:t>scene</a:t>
+            </a:r>
+            <a:endParaRPr/>
+          </a:p>
+        </p:txBody>
+      </p:sp>
+      <p:sp>
+        <p:nvSpPr>
+          <p:cNvPr id="50" name="CustomShape 15"/>
           <p:cNvSpPr/>
           <p:nvPr/>
         </p:nvSpPr>
         <p:spPr>
           <a:xfrm>
             <a:off x="7801920" y="398160"/>
-            <a:ext cx="1181880" cy="360"/>
+            <a:ext cx="1181520" cy="360"/>
           </a:xfrm>
           <a:prstGeom prst="straightConnector1">
             <a:avLst/>
@@ -2183,14 +2157,14 @@
       </p:sp>
       <p:sp>
         <p:nvSpPr>
-          <p:cNvPr id="52" name="CustomShape 17"/>
+          <p:cNvPr id="51" name="CustomShape 16"/>
           <p:cNvSpPr/>
           <p:nvPr/>
         </p:nvSpPr>
         <p:spPr>
           <a:xfrm>
             <a:off x="8049240" y="125280"/>
-            <a:ext cx="727920" cy="272520"/>
+            <a:ext cx="727560" cy="272160"/>
           </a:xfrm>
           <a:prstGeom prst="rect">
             <a:avLst/>
@@ -2220,6 +2194,44 @@
             <a:endParaRPr/>
           </a:p>
         </p:txBody>
+      </p:sp>
+      <p:sp>
+        <p:nvSpPr>
+          <p:cNvPr id="52" name="Freeform 17"/>
+          <p:cNvSpPr/>
+          <p:nvPr/>
+        </p:nvSpPr>
+        <p:spPr>
+          <a:xfrm>
+            <a:off x="7224120" y="1136520"/>
+            <a:ext cx="1106280" cy="344160"/>
+          </a:xfrm>
+          <a:custGeom>
+            <a:avLst/>
+            <a:gdLst/>
+            <a:ahLst/>
+            <a:rect l="0" t="0" r="r" b="b"/>
+            <a:pathLst>
+              <a:path w="3073" h="956">
+                <a:moveTo>
+                  <a:pt x="0" y="0"/>
+                </a:moveTo>
+                <a:cubicBezTo>
+                  <a:pt x="396" y="887"/>
+                  <a:pt x="2609" y="955"/>
+                  <a:pt x="3072" y="0"/>
+                </a:cubicBezTo>
+              </a:path>
+            </a:pathLst>
+          </a:custGeom>
+          <a:ln w="9000">
+            <a:solidFill>
+              <a:srgbClr val="000000"/>
+            </a:solidFill>
+            <a:round/>
+            <a:tailEnd len="med" type="triangle" w="med"/>
+          </a:ln>
+        </p:spPr>
       </p:sp>
     </p:spTree>
   </p:cSld>

</xml_diff>